<commit_message>
atualizando slides do trabalho para segunda-feira
</commit_message>
<xml_diff>
--- a/UC_3/aula_1/Apresentacao.pptx
+++ b/UC_3/aula_1/Apresentacao.pptx
@@ -7,13 +7,21 @@
   <p:sldIdLst>
     <p:sldId id="256" r:id="rId2"/>
     <p:sldId id="257" r:id="rId3"/>
-    <p:sldId id="258" r:id="rId4"/>
-    <p:sldId id="259" r:id="rId5"/>
-    <p:sldId id="261" r:id="rId6"/>
-    <p:sldId id="262" r:id="rId7"/>
-    <p:sldId id="260" r:id="rId8"/>
-    <p:sldId id="264" r:id="rId9"/>
-    <p:sldId id="263" r:id="rId10"/>
+    <p:sldId id="270" r:id="rId4"/>
+    <p:sldId id="271" r:id="rId5"/>
+    <p:sldId id="272" r:id="rId6"/>
+    <p:sldId id="258" r:id="rId7"/>
+    <p:sldId id="259" r:id="rId8"/>
+    <p:sldId id="261" r:id="rId9"/>
+    <p:sldId id="268" r:id="rId10"/>
+    <p:sldId id="266" r:id="rId11"/>
+    <p:sldId id="267" r:id="rId12"/>
+    <p:sldId id="262" r:id="rId13"/>
+    <p:sldId id="260" r:id="rId14"/>
+    <p:sldId id="264" r:id="rId15"/>
+    <p:sldId id="265" r:id="rId16"/>
+    <p:sldId id="269" r:id="rId17"/>
+    <p:sldId id="263" r:id="rId18"/>
   </p:sldIdLst>
   <p:sldSz cx="12192000" cy="6858000"/>
   <p:notesSz cx="6858000" cy="9144000"/>
@@ -114,7 +122,7 @@
   </p:defaultTextStyle>
   <p:extLst>
     <p:ext uri="{EFAFB233-063F-42B5-8137-9DF3F51BA10A}">
-      <p15:sldGuideLst xmlns:p15="http://schemas.microsoft.com/office/powerpoint/2012/main"/>
+      <p15:sldGuideLst xmlns:p15="http://schemas.microsoft.com/office/powerpoint/2012/main" xmlns=""/>
     </p:ext>
   </p:extLst>
 </p:presentation>
@@ -3040,6 +3048,766 @@
 </p:sld>
 </file>
 
+<file path=ppt/slides/slide10.xml><?xml version="1.0" encoding="utf-8"?>
+<p:sld xmlns:a="http://schemas.openxmlformats.org/drawingml/2006/main" xmlns:r="http://schemas.openxmlformats.org/officeDocument/2006/relationships" xmlns:p="http://schemas.openxmlformats.org/presentationml/2006/main">
+  <p:cSld>
+    <p:spTree>
+      <p:nvGrpSpPr>
+        <p:cNvPr id="1" name=""/>
+        <p:cNvGrpSpPr/>
+        <p:nvPr/>
+      </p:nvGrpSpPr>
+      <p:grpSpPr>
+        <a:xfrm>
+          <a:off x="0" y="0"/>
+          <a:ext cx="0" cy="0"/>
+          <a:chOff x="0" y="0"/>
+          <a:chExt cx="0" cy="0"/>
+        </a:xfrm>
+      </p:grpSpPr>
+      <p:sp>
+        <p:nvSpPr>
+          <p:cNvPr id="2" name="Título 1"/>
+          <p:cNvSpPr>
+            <a:spLocks noGrp="1"/>
+          </p:cNvSpPr>
+          <p:nvPr>
+            <p:ph type="title"/>
+          </p:nvPr>
+        </p:nvSpPr>
+        <p:spPr/>
+        <p:txBody>
+          <a:bodyPr/>
+          <a:lstStyle/>
+          <a:p>
+            <a:r>
+              <a:rPr lang="pt-BR" dirty="0" smtClean="0"/>
+              <a:t>Estabelecendo Conexão Segura</a:t>
+            </a:r>
+            <a:endParaRPr lang="pt-BR" dirty="0"/>
+          </a:p>
+        </p:txBody>
+      </p:sp>
+      <p:pic>
+        <p:nvPicPr>
+          <p:cNvPr id="4" name="Espaço Reservado para Conteúdo 3"/>
+          <p:cNvPicPr>
+            <a:picLocks noGrp="1" noChangeAspect="1"/>
+          </p:cNvPicPr>
+          <p:nvPr>
+            <p:ph idx="1"/>
+          </p:nvPr>
+        </p:nvPicPr>
+        <p:blipFill>
+          <a:blip r:embed="rId2">
+            <a:extLst>
+              <a:ext uri="{28A0092B-C50C-407E-A947-70E740481C1C}">
+                <a14:useLocalDpi xmlns:a14="http://schemas.microsoft.com/office/drawing/2010/main" val="0"/>
+              </a:ext>
+            </a:extLst>
+          </a:blip>
+          <a:stretch>
+            <a:fillRect/>
+          </a:stretch>
+        </p:blipFill>
+        <p:spPr>
+          <a:xfrm>
+            <a:off x="1804987" y="2001044"/>
+            <a:ext cx="8582025" cy="4000500"/>
+          </a:xfrm>
+        </p:spPr>
+      </p:pic>
+    </p:spTree>
+    <p:extLst>
+      <p:ext uri="{BB962C8B-B14F-4D97-AF65-F5344CB8AC3E}">
+        <p14:creationId xmlns:p14="http://schemas.microsoft.com/office/powerpoint/2010/main" val="3252570001"/>
+      </p:ext>
+    </p:extLst>
+  </p:cSld>
+  <p:clrMapOvr>
+    <a:masterClrMapping/>
+  </p:clrMapOvr>
+</p:sld>
+</file>
+
+<file path=ppt/slides/slide11.xml><?xml version="1.0" encoding="utf-8"?>
+<p:sld xmlns:a="http://schemas.openxmlformats.org/drawingml/2006/main" xmlns:r="http://schemas.openxmlformats.org/officeDocument/2006/relationships" xmlns:p="http://schemas.openxmlformats.org/presentationml/2006/main">
+  <p:cSld>
+    <p:spTree>
+      <p:nvGrpSpPr>
+        <p:cNvPr id="1" name=""/>
+        <p:cNvGrpSpPr/>
+        <p:nvPr/>
+      </p:nvGrpSpPr>
+      <p:grpSpPr>
+        <a:xfrm>
+          <a:off x="0" y="0"/>
+          <a:ext cx="0" cy="0"/>
+          <a:chOff x="0" y="0"/>
+          <a:chExt cx="0" cy="0"/>
+        </a:xfrm>
+      </p:grpSpPr>
+      <p:sp>
+        <p:nvSpPr>
+          <p:cNvPr id="2" name="Título 1"/>
+          <p:cNvSpPr>
+            <a:spLocks noGrp="1"/>
+          </p:cNvSpPr>
+          <p:nvPr>
+            <p:ph type="title"/>
+          </p:nvPr>
+        </p:nvSpPr>
+        <p:spPr/>
+        <p:txBody>
+          <a:bodyPr/>
+          <a:lstStyle/>
+          <a:p>
+            <a:r>
+              <a:rPr lang="pt-BR" dirty="0" smtClean="0"/>
+              <a:t>Conexão Segura (HTTP </a:t>
+            </a:r>
+            <a:r>
+              <a:rPr lang="pt-BR" dirty="0" err="1" smtClean="0"/>
+              <a:t>vs</a:t>
+            </a:r>
+            <a:r>
+              <a:rPr lang="pt-BR" dirty="0" smtClean="0"/>
+              <a:t> HTTPS)</a:t>
+            </a:r>
+            <a:endParaRPr lang="pt-BR" dirty="0"/>
+          </a:p>
+        </p:txBody>
+      </p:sp>
+      <p:pic>
+        <p:nvPicPr>
+          <p:cNvPr id="4" name="Espaço Reservado para Conteúdo 3"/>
+          <p:cNvPicPr>
+            <a:picLocks noGrp="1" noChangeAspect="1"/>
+          </p:cNvPicPr>
+          <p:nvPr>
+            <p:ph idx="1"/>
+          </p:nvPr>
+        </p:nvPicPr>
+        <p:blipFill>
+          <a:blip r:embed="rId2">
+            <a:extLst>
+              <a:ext uri="{28A0092B-C50C-407E-A947-70E740481C1C}">
+                <a14:useLocalDpi xmlns:a14="http://schemas.microsoft.com/office/drawing/2010/main" val="0"/>
+              </a:ext>
+            </a:extLst>
+          </a:blip>
+          <a:stretch>
+            <a:fillRect/>
+          </a:stretch>
+        </p:blipFill>
+        <p:spPr>
+          <a:xfrm>
+            <a:off x="333876" y="1645108"/>
+            <a:ext cx="11648598" cy="4659439"/>
+          </a:xfrm>
+        </p:spPr>
+      </p:pic>
+    </p:spTree>
+    <p:extLst>
+      <p:ext uri="{BB962C8B-B14F-4D97-AF65-F5344CB8AC3E}">
+        <p14:creationId xmlns:p14="http://schemas.microsoft.com/office/powerpoint/2010/main" val="19071502"/>
+      </p:ext>
+    </p:extLst>
+  </p:cSld>
+  <p:clrMapOvr>
+    <a:masterClrMapping/>
+  </p:clrMapOvr>
+</p:sld>
+</file>
+
+<file path=ppt/slides/slide12.xml><?xml version="1.0" encoding="utf-8"?>
+<p:sld xmlns:a="http://schemas.openxmlformats.org/drawingml/2006/main" xmlns:r="http://schemas.openxmlformats.org/officeDocument/2006/relationships" xmlns:p="http://schemas.openxmlformats.org/presentationml/2006/main">
+  <p:cSld>
+    <p:spTree>
+      <p:nvGrpSpPr>
+        <p:cNvPr id="1" name=""/>
+        <p:cNvGrpSpPr/>
+        <p:nvPr/>
+      </p:nvGrpSpPr>
+      <p:grpSpPr>
+        <a:xfrm>
+          <a:off x="0" y="0"/>
+          <a:ext cx="0" cy="0"/>
+          <a:chOff x="0" y="0"/>
+          <a:chExt cx="0" cy="0"/>
+        </a:xfrm>
+      </p:grpSpPr>
+      <p:sp>
+        <p:nvSpPr>
+          <p:cNvPr id="2" name="Título 1"/>
+          <p:cNvSpPr>
+            <a:spLocks noGrp="1"/>
+          </p:cNvSpPr>
+          <p:nvPr>
+            <p:ph type="title"/>
+          </p:nvPr>
+        </p:nvSpPr>
+        <p:spPr/>
+        <p:txBody>
+          <a:bodyPr/>
+          <a:lstStyle/>
+          <a:p>
+            <a:r>
+              <a:rPr lang="pt-BR" dirty="0" smtClean="0"/>
+              <a:t>Ferramenta </a:t>
+            </a:r>
+            <a:r>
+              <a:rPr lang="pt-BR" dirty="0" err="1" smtClean="0"/>
+              <a:t>Wireshark</a:t>
+            </a:r>
+            <a:endParaRPr lang="pt-BR" dirty="0"/>
+          </a:p>
+        </p:txBody>
+      </p:sp>
+      <p:sp>
+        <p:nvSpPr>
+          <p:cNvPr id="3" name="Espaço Reservado para Conteúdo 2"/>
+          <p:cNvSpPr>
+            <a:spLocks noGrp="1"/>
+          </p:cNvSpPr>
+          <p:nvPr>
+            <p:ph idx="1"/>
+          </p:nvPr>
+        </p:nvSpPr>
+        <p:spPr/>
+        <p:txBody>
+          <a:bodyPr/>
+          <a:lstStyle/>
+          <a:p>
+            <a:r>
+              <a:rPr lang="pt-BR" dirty="0" smtClean="0"/>
+              <a:t>Link</a:t>
+            </a:r>
+            <a:endParaRPr lang="pt-BR" dirty="0"/>
+          </a:p>
+        </p:txBody>
+      </p:sp>
+    </p:spTree>
+    <p:extLst>
+      <p:ext uri="{BB962C8B-B14F-4D97-AF65-F5344CB8AC3E}">
+        <p14:creationId xmlns:p14="http://schemas.microsoft.com/office/powerpoint/2010/main" val="3178691861"/>
+      </p:ext>
+    </p:extLst>
+  </p:cSld>
+  <p:clrMapOvr>
+    <a:masterClrMapping/>
+  </p:clrMapOvr>
+</p:sld>
+</file>
+
+<file path=ppt/slides/slide13.xml><?xml version="1.0" encoding="utf-8"?>
+<p:sld xmlns:a="http://schemas.openxmlformats.org/drawingml/2006/main" xmlns:r="http://schemas.openxmlformats.org/officeDocument/2006/relationships" xmlns:p="http://schemas.openxmlformats.org/presentationml/2006/main">
+  <p:cSld>
+    <p:spTree>
+      <p:nvGrpSpPr>
+        <p:cNvPr id="1" name=""/>
+        <p:cNvGrpSpPr/>
+        <p:nvPr/>
+      </p:nvGrpSpPr>
+      <p:grpSpPr>
+        <a:xfrm>
+          <a:off x="0" y="0"/>
+          <a:ext cx="0" cy="0"/>
+          <a:chOff x="0" y="0"/>
+          <a:chExt cx="0" cy="0"/>
+        </a:xfrm>
+      </p:grpSpPr>
+      <p:sp>
+        <p:nvSpPr>
+          <p:cNvPr id="2" name="Título 1"/>
+          <p:cNvSpPr>
+            <a:spLocks noGrp="1"/>
+          </p:cNvSpPr>
+          <p:nvPr>
+            <p:ph type="title"/>
+          </p:nvPr>
+        </p:nvSpPr>
+        <p:spPr/>
+        <p:txBody>
+          <a:bodyPr/>
+          <a:lstStyle/>
+          <a:p>
+            <a:r>
+              <a:rPr lang="pt-BR" dirty="0" err="1" smtClean="0"/>
+              <a:t>URLs</a:t>
+            </a:r>
+            <a:endParaRPr lang="pt-BR" dirty="0"/>
+          </a:p>
+        </p:txBody>
+      </p:sp>
+      <p:sp>
+        <p:nvSpPr>
+          <p:cNvPr id="3" name="Espaço Reservado para Conteúdo 2"/>
+          <p:cNvSpPr>
+            <a:spLocks noGrp="1"/>
+          </p:cNvSpPr>
+          <p:nvPr>
+            <p:ph idx="1"/>
+          </p:nvPr>
+        </p:nvSpPr>
+        <p:spPr/>
+        <p:txBody>
+          <a:bodyPr/>
+          <a:lstStyle/>
+          <a:p>
+            <a:r>
+              <a:rPr lang="pt-BR" dirty="0" smtClean="0"/>
+              <a:t>texto</a:t>
+            </a:r>
+            <a:endParaRPr lang="pt-BR" dirty="0"/>
+          </a:p>
+        </p:txBody>
+      </p:sp>
+    </p:spTree>
+    <p:extLst>
+      <p:ext uri="{BB962C8B-B14F-4D97-AF65-F5344CB8AC3E}">
+        <p14:creationId xmlns:p14="http://schemas.microsoft.com/office/powerpoint/2010/main" val="3422039854"/>
+      </p:ext>
+    </p:extLst>
+  </p:cSld>
+  <p:clrMapOvr>
+    <a:masterClrMapping/>
+  </p:clrMapOvr>
+</p:sld>
+</file>
+
+<file path=ppt/slides/slide14.xml><?xml version="1.0" encoding="utf-8"?>
+<p:sld xmlns:a="http://schemas.openxmlformats.org/drawingml/2006/main" xmlns:r="http://schemas.openxmlformats.org/officeDocument/2006/relationships" xmlns:p="http://schemas.openxmlformats.org/presentationml/2006/main">
+  <p:cSld>
+    <p:spTree>
+      <p:nvGrpSpPr>
+        <p:cNvPr id="1" name=""/>
+        <p:cNvGrpSpPr/>
+        <p:nvPr/>
+      </p:nvGrpSpPr>
+      <p:grpSpPr>
+        <a:xfrm>
+          <a:off x="0" y="0"/>
+          <a:ext cx="0" cy="0"/>
+          <a:chOff x="0" y="0"/>
+          <a:chExt cx="0" cy="0"/>
+        </a:xfrm>
+      </p:grpSpPr>
+      <p:sp>
+        <p:nvSpPr>
+          <p:cNvPr id="2" name="Título 1"/>
+          <p:cNvSpPr>
+            <a:spLocks noGrp="1"/>
+          </p:cNvSpPr>
+          <p:nvPr>
+            <p:ph type="title"/>
+          </p:nvPr>
+        </p:nvSpPr>
+        <p:spPr/>
+        <p:txBody>
+          <a:bodyPr/>
+          <a:lstStyle/>
+          <a:p>
+            <a:r>
+              <a:rPr lang="pt-BR" dirty="0" smtClean="0"/>
+              <a:t>Hora da </a:t>
+            </a:r>
+            <a:r>
+              <a:rPr lang="pt-BR" smtClean="0"/>
+              <a:t>Brincadeira Pessoal !!!</a:t>
+            </a:r>
+            <a:endParaRPr lang="pt-BR" dirty="0"/>
+          </a:p>
+        </p:txBody>
+      </p:sp>
+      <p:sp>
+        <p:nvSpPr>
+          <p:cNvPr id="3" name="Espaço Reservado para Conteúdo 2"/>
+          <p:cNvSpPr>
+            <a:spLocks noGrp="1"/>
+          </p:cNvSpPr>
+          <p:nvPr>
+            <p:ph idx="1"/>
+          </p:nvPr>
+        </p:nvSpPr>
+        <p:spPr/>
+        <p:txBody>
+          <a:bodyPr/>
+          <a:lstStyle/>
+          <a:p>
+            <a:r>
+              <a:rPr lang="pt-BR" dirty="0" smtClean="0"/>
+              <a:t>link</a:t>
+            </a:r>
+            <a:endParaRPr lang="pt-BR" dirty="0"/>
+          </a:p>
+        </p:txBody>
+      </p:sp>
+    </p:spTree>
+    <p:extLst>
+      <p:ext uri="{BB962C8B-B14F-4D97-AF65-F5344CB8AC3E}">
+        <p14:creationId xmlns:p14="http://schemas.microsoft.com/office/powerpoint/2010/main" val="1663024192"/>
+      </p:ext>
+    </p:extLst>
+  </p:cSld>
+  <p:clrMapOvr>
+    <a:masterClrMapping/>
+  </p:clrMapOvr>
+</p:sld>
+</file>
+
+<file path=ppt/slides/slide15.xml><?xml version="1.0" encoding="utf-8"?>
+<p:sld xmlns:a="http://schemas.openxmlformats.org/drawingml/2006/main" xmlns:r="http://schemas.openxmlformats.org/officeDocument/2006/relationships" xmlns:p="http://schemas.openxmlformats.org/presentationml/2006/main">
+  <p:cSld>
+    <p:spTree>
+      <p:nvGrpSpPr>
+        <p:cNvPr id="1" name=""/>
+        <p:cNvGrpSpPr/>
+        <p:nvPr/>
+      </p:nvGrpSpPr>
+      <p:grpSpPr>
+        <a:xfrm>
+          <a:off x="0" y="0"/>
+          <a:ext cx="0" cy="0"/>
+          <a:chOff x="0" y="0"/>
+          <a:chExt cx="0" cy="0"/>
+        </a:xfrm>
+      </p:grpSpPr>
+      <p:sp>
+        <p:nvSpPr>
+          <p:cNvPr id="2" name="Título 1"/>
+          <p:cNvSpPr>
+            <a:spLocks noGrp="1"/>
+          </p:cNvSpPr>
+          <p:nvPr>
+            <p:ph type="title"/>
+          </p:nvPr>
+        </p:nvSpPr>
+        <p:spPr/>
+        <p:txBody>
+          <a:bodyPr/>
+          <a:lstStyle/>
+          <a:p>
+            <a:r>
+              <a:rPr lang="pt-BR" dirty="0" smtClean="0"/>
+              <a:t>Referencias</a:t>
+            </a:r>
+            <a:endParaRPr lang="pt-BR" dirty="0"/>
+          </a:p>
+        </p:txBody>
+      </p:sp>
+      <p:sp>
+        <p:nvSpPr>
+          <p:cNvPr id="3" name="Espaço Reservado para Conteúdo 2"/>
+          <p:cNvSpPr>
+            <a:spLocks noGrp="1"/>
+          </p:cNvSpPr>
+          <p:nvPr>
+            <p:ph idx="1"/>
+          </p:nvPr>
+        </p:nvSpPr>
+        <p:spPr/>
+        <p:txBody>
+          <a:bodyPr>
+            <a:normAutofit fontScale="85000" lnSpcReduction="20000"/>
+          </a:bodyPr>
+          <a:lstStyle/>
+          <a:p>
+            <a:r>
+              <a:rPr lang="pt-BR" dirty="0">
+                <a:hlinkClick r:id="rId2"/>
+              </a:rPr>
+              <a:t>https://www.hostinger.com.br/tutoriais/o-que-e-ssl-tls-https</a:t>
+            </a:r>
+            <a:r>
+              <a:rPr lang="pt-BR" dirty="0" smtClean="0">
+                <a:hlinkClick r:id="rId2"/>
+              </a:rPr>
+              <a:t>/</a:t>
+            </a:r>
+            <a:endParaRPr lang="pt-BR" dirty="0" smtClean="0"/>
+          </a:p>
+          <a:p>
+            <a:r>
+              <a:rPr lang="pt-BR" dirty="0"/>
+              <a:t>TANENBAUM, A. S. </a:t>
+            </a:r>
+            <a:r>
+              <a:rPr lang="pt-BR" b="1" dirty="0"/>
+              <a:t>Redes de computadores</a:t>
+            </a:r>
+            <a:r>
+              <a:rPr lang="pt-BR" dirty="0"/>
+              <a:t>. 4ed. 2003. Rio de Janeiro: </a:t>
+            </a:r>
+            <a:r>
+              <a:rPr lang="pt-BR" dirty="0" err="1"/>
+              <a:t>Elsevier</a:t>
+            </a:r>
+            <a:r>
+              <a:rPr lang="pt-BR" dirty="0"/>
+              <a:t> Editora. 2003.</a:t>
+            </a:r>
+          </a:p>
+          <a:p>
+            <a:r>
+              <a:rPr lang="pt-BR" dirty="0"/>
+              <a:t>SITE BLINDADO. </a:t>
+            </a:r>
+            <a:r>
+              <a:rPr lang="pt-BR" b="1" dirty="0"/>
+              <a:t>TLS x SSL</a:t>
+            </a:r>
+            <a:r>
+              <a:rPr lang="pt-BR" dirty="0"/>
+              <a:t>: quais diferenças desses protocolos?. Disponível em: &lt; http://blog.siteblindado.com/2014/02/07/tls-ssl-diferencas-protocolos/ &gt;. Acessado em: 14 Set. 2017.</a:t>
+            </a:r>
+          </a:p>
+          <a:p>
+            <a:r>
+              <a:rPr lang="pt-BR" dirty="0"/>
+              <a:t>COMODO BR. </a:t>
+            </a:r>
+            <a:r>
+              <a:rPr lang="pt-BR" b="1" dirty="0"/>
+              <a:t>O que é SSL?. </a:t>
+            </a:r>
+            <a:r>
+              <a:rPr lang="pt-BR" dirty="0"/>
+              <a:t>Disponível em: &lt;http://www.comodobr.com/ssl_o_que_e.php&gt;. Acessado em: 14 Set. 2017.</a:t>
+            </a:r>
+          </a:p>
+          <a:p>
+            <a:r>
+              <a:rPr lang="pt-BR" dirty="0"/>
+              <a:t>WIKIPÉDIA. </a:t>
+            </a:r>
+            <a:r>
+              <a:rPr lang="pt-BR" dirty="0" err="1"/>
+              <a:t>Transport</a:t>
+            </a:r>
+            <a:r>
+              <a:rPr lang="pt-BR" dirty="0"/>
+              <a:t> </a:t>
+            </a:r>
+            <a:r>
+              <a:rPr lang="pt-BR" dirty="0" err="1"/>
+              <a:t>Layer</a:t>
+            </a:r>
+            <a:r>
+              <a:rPr lang="pt-BR" dirty="0"/>
+              <a:t> Security. Disponível em: &lt; https://pt.wikipedia.org/wiki/Transport_Layer_Security&gt;. Acessado em: 14 Set. 2017.</a:t>
+            </a:r>
+          </a:p>
+          <a:p>
+            <a:r>
+              <a:rPr lang="pt-BR" dirty="0"/>
+              <a:t>GTA / UFRJ. </a:t>
+            </a:r>
+            <a:r>
+              <a:rPr lang="pt-BR" b="1" dirty="0"/>
+              <a:t>SSL x TLS</a:t>
+            </a:r>
+            <a:r>
+              <a:rPr lang="pt-BR" dirty="0"/>
+              <a:t>. Disponível em: &lt; https://www.gta.ufrj.br/grad/06_1/ssl/func_tls.htm&gt;. Acessado em: 14 Set. 2017.</a:t>
+            </a:r>
+          </a:p>
+          <a:p>
+            <a:endParaRPr lang="pt-BR" dirty="0" smtClean="0"/>
+          </a:p>
+          <a:p>
+            <a:endParaRPr lang="pt-BR" dirty="0"/>
+          </a:p>
+        </p:txBody>
+      </p:sp>
+    </p:spTree>
+    <p:extLst>
+      <p:ext uri="{BB962C8B-B14F-4D97-AF65-F5344CB8AC3E}">
+        <p14:creationId xmlns:p14="http://schemas.microsoft.com/office/powerpoint/2010/main" val="402661431"/>
+      </p:ext>
+    </p:extLst>
+  </p:cSld>
+  <p:clrMapOvr>
+    <a:masterClrMapping/>
+  </p:clrMapOvr>
+</p:sld>
+</file>
+
+<file path=ppt/slides/slide16.xml><?xml version="1.0" encoding="utf-8"?>
+<p:sld xmlns:a="http://schemas.openxmlformats.org/drawingml/2006/main" xmlns:r="http://schemas.openxmlformats.org/officeDocument/2006/relationships" xmlns:p="http://schemas.openxmlformats.org/presentationml/2006/main">
+  <p:cSld>
+    <p:spTree>
+      <p:nvGrpSpPr>
+        <p:cNvPr id="1" name=""/>
+        <p:cNvGrpSpPr/>
+        <p:nvPr/>
+      </p:nvGrpSpPr>
+      <p:grpSpPr>
+        <a:xfrm>
+          <a:off x="0" y="0"/>
+          <a:ext cx="0" cy="0"/>
+          <a:chOff x="0" y="0"/>
+          <a:chExt cx="0" cy="0"/>
+        </a:xfrm>
+      </p:grpSpPr>
+      <p:sp>
+        <p:nvSpPr>
+          <p:cNvPr id="2" name="Título 1"/>
+          <p:cNvSpPr>
+            <a:spLocks noGrp="1"/>
+          </p:cNvSpPr>
+          <p:nvPr>
+            <p:ph type="title"/>
+          </p:nvPr>
+        </p:nvSpPr>
+        <p:spPr/>
+        <p:txBody>
+          <a:bodyPr/>
+          <a:lstStyle/>
+          <a:p>
+            <a:endParaRPr lang="pt-BR"/>
+          </a:p>
+        </p:txBody>
+      </p:sp>
+      <p:sp>
+        <p:nvSpPr>
+          <p:cNvPr id="3" name="Espaço Reservado para Conteúdo 2"/>
+          <p:cNvSpPr>
+            <a:spLocks noGrp="1"/>
+          </p:cNvSpPr>
+          <p:nvPr>
+            <p:ph idx="1"/>
+          </p:nvPr>
+        </p:nvSpPr>
+        <p:spPr/>
+        <p:txBody>
+          <a:bodyPr/>
+          <a:lstStyle/>
+          <a:p>
+            <a:r>
+              <a:rPr lang="pt-BR" dirty="0">
+                <a:hlinkClick r:id="rId2"/>
+              </a:rPr>
+              <a:t>https://blog.siteblindado.com/tls-ssl-diferencas-protocolos/</a:t>
+            </a:r>
+            <a:endParaRPr lang="pt-BR" dirty="0"/>
+          </a:p>
+        </p:txBody>
+      </p:sp>
+    </p:spTree>
+    <p:extLst>
+      <p:ext uri="{BB962C8B-B14F-4D97-AF65-F5344CB8AC3E}">
+        <p14:creationId xmlns:p14="http://schemas.microsoft.com/office/powerpoint/2010/main" val="1097765755"/>
+      </p:ext>
+    </p:extLst>
+  </p:cSld>
+  <p:clrMapOvr>
+    <a:masterClrMapping/>
+  </p:clrMapOvr>
+</p:sld>
+</file>
+
+<file path=ppt/slides/slide17.xml><?xml version="1.0" encoding="utf-8"?>
+<p:sld xmlns:a="http://schemas.openxmlformats.org/drawingml/2006/main" xmlns:r="http://schemas.openxmlformats.org/officeDocument/2006/relationships" xmlns:p="http://schemas.openxmlformats.org/presentationml/2006/main">
+  <p:cSld>
+    <p:spTree>
+      <p:nvGrpSpPr>
+        <p:cNvPr id="1" name=""/>
+        <p:cNvGrpSpPr/>
+        <p:nvPr/>
+      </p:nvGrpSpPr>
+      <p:grpSpPr>
+        <a:xfrm>
+          <a:off x="0" y="0"/>
+          <a:ext cx="0" cy="0"/>
+          <a:chOff x="0" y="0"/>
+          <a:chExt cx="0" cy="0"/>
+        </a:xfrm>
+      </p:grpSpPr>
+      <p:sp>
+        <p:nvSpPr>
+          <p:cNvPr id="2" name="Título 1"/>
+          <p:cNvSpPr>
+            <a:spLocks noGrp="1"/>
+          </p:cNvSpPr>
+          <p:nvPr>
+            <p:ph type="title"/>
+          </p:nvPr>
+        </p:nvSpPr>
+        <p:spPr/>
+        <p:txBody>
+          <a:bodyPr/>
+          <a:lstStyle/>
+          <a:p>
+            <a:r>
+              <a:rPr lang="pt-BR" dirty="0" smtClean="0"/>
+              <a:t>Integrantes do Grupo</a:t>
+            </a:r>
+            <a:endParaRPr lang="pt-BR" dirty="0"/>
+          </a:p>
+        </p:txBody>
+      </p:sp>
+      <p:sp>
+        <p:nvSpPr>
+          <p:cNvPr id="3" name="Espaço Reservado para Conteúdo 2"/>
+          <p:cNvSpPr>
+            <a:spLocks noGrp="1"/>
+          </p:cNvSpPr>
+          <p:nvPr>
+            <p:ph idx="1"/>
+          </p:nvPr>
+        </p:nvSpPr>
+        <p:spPr/>
+        <p:txBody>
+          <a:bodyPr/>
+          <a:lstStyle/>
+          <a:p>
+            <a:r>
+              <a:rPr lang="pt-BR" dirty="0" smtClean="0"/>
+              <a:t>Carlos</a:t>
+            </a:r>
+          </a:p>
+          <a:p>
+            <a:r>
+              <a:rPr lang="pt-BR" dirty="0" smtClean="0"/>
+              <a:t>Eduardo</a:t>
+            </a:r>
+          </a:p>
+          <a:p>
+            <a:r>
+              <a:rPr lang="pt-BR" dirty="0" smtClean="0"/>
+              <a:t>Karoline</a:t>
+            </a:r>
+          </a:p>
+          <a:p>
+            <a:r>
+              <a:rPr lang="pt-BR" dirty="0" smtClean="0"/>
+              <a:t>Guilherme</a:t>
+            </a:r>
+          </a:p>
+          <a:p>
+            <a:r>
+              <a:rPr lang="pt-BR" dirty="0" smtClean="0"/>
+              <a:t>Vinicius</a:t>
+            </a:r>
+            <a:endParaRPr lang="pt-BR" dirty="0"/>
+          </a:p>
+        </p:txBody>
+      </p:sp>
+    </p:spTree>
+    <p:extLst>
+      <p:ext uri="{BB962C8B-B14F-4D97-AF65-F5344CB8AC3E}">
+        <p14:creationId xmlns:p14="http://schemas.microsoft.com/office/powerpoint/2010/main" val="2695727957"/>
+      </p:ext>
+    </p:extLst>
+  </p:cSld>
+  <p:clrMapOvr>
+    <a:masterClrMapping/>
+  </p:clrMapOvr>
+</p:sld>
+</file>
+
 <file path=ppt/slides/slide2.xml><?xml version="1.0" encoding="utf-8"?>
 <p:sld xmlns:a="http://schemas.openxmlformats.org/drawingml/2006/main" xmlns:r="http://schemas.openxmlformats.org/officeDocument/2006/relationships" xmlns:p="http://schemas.openxmlformats.org/presentationml/2006/main">
   <p:cSld>
@@ -3150,7 +3918,7 @@
           <a:p>
             <a:r>
               <a:rPr lang="pt-BR" dirty="0" smtClean="0"/>
-              <a:t>Protocolo HTTP</a:t>
+              <a:t>As camadas</a:t>
             </a:r>
             <a:endParaRPr lang="pt-BR" dirty="0"/>
           </a:p>
@@ -3173,7 +3941,31 @@
           <a:p>
             <a:r>
               <a:rPr lang="pt-BR" dirty="0" smtClean="0"/>
-              <a:t>texto</a:t>
+              <a:t>Modelo OSI (modelo de referencia);</a:t>
+            </a:r>
+          </a:p>
+          <a:p>
+            <a:r>
+              <a:rPr lang="pt-BR" dirty="0" smtClean="0"/>
+              <a:t>Modelo TCP/IP;</a:t>
+            </a:r>
+          </a:p>
+          <a:p>
+            <a:r>
+              <a:rPr lang="pt-BR" dirty="0" smtClean="0"/>
+              <a:t>Cada camada atua de forma especifica; </a:t>
+            </a:r>
+          </a:p>
+          <a:p>
+            <a:r>
+              <a:rPr lang="pt-BR" dirty="0" smtClean="0"/>
+              <a:t>Camadas encapsulam dados;</a:t>
+            </a:r>
+          </a:p>
+          <a:p>
+            <a:r>
+              <a:rPr lang="pt-BR" dirty="0" smtClean="0"/>
+              <a:t>Encapsulamento de baixo para cima.</a:t>
             </a:r>
             <a:endParaRPr lang="pt-BR" dirty="0"/>
           </a:p>
@@ -3182,7 +3974,7 @@
     </p:spTree>
     <p:extLst>
       <p:ext uri="{BB962C8B-B14F-4D97-AF65-F5344CB8AC3E}">
-        <p14:creationId xmlns:p14="http://schemas.microsoft.com/office/powerpoint/2010/main" val="133886971"/>
+        <p14:creationId xmlns:p14="http://schemas.microsoft.com/office/powerpoint/2010/main" val="535192680"/>
       </p:ext>
     </p:extLst>
   </p:cSld>
@@ -3226,39 +4018,75 @@
           <a:p>
             <a:r>
               <a:rPr lang="pt-BR" dirty="0" smtClean="0"/>
-              <a:t>Protocolo HTTPS</a:t>
+              <a:t>Modelo OSI</a:t>
             </a:r>
             <a:endParaRPr lang="pt-BR" dirty="0"/>
           </a:p>
         </p:txBody>
       </p:sp>
-      <p:sp>
-        <p:nvSpPr>
-          <p:cNvPr id="3" name="Espaço Reservado para Conteúdo 2"/>
-          <p:cNvSpPr>
-            <a:spLocks noGrp="1"/>
-          </p:cNvSpPr>
+      <p:pic>
+        <p:nvPicPr>
+          <p:cNvPr id="4" name="Espaço Reservado para Conteúdo 3"/>
+          <p:cNvPicPr>
+            <a:picLocks noGrp="1" noChangeAspect="1"/>
+          </p:cNvPicPr>
           <p:nvPr>
             <p:ph idx="1"/>
           </p:nvPr>
-        </p:nvSpPr>
-        <p:spPr/>
-        <p:txBody>
-          <a:bodyPr/>
-          <a:lstStyle/>
-          <a:p>
-            <a:r>
-              <a:rPr lang="pt-BR" dirty="0" smtClean="0"/>
-              <a:t>texto</a:t>
-            </a:r>
-            <a:endParaRPr lang="pt-BR" dirty="0"/>
-          </a:p>
-        </p:txBody>
-      </p:sp>
+        </p:nvPicPr>
+        <p:blipFill>
+          <a:blip r:embed="rId2">
+            <a:extLst>
+              <a:ext uri="{28A0092B-C50C-407E-A947-70E740481C1C}">
+                <a14:useLocalDpi xmlns:a14="http://schemas.microsoft.com/office/drawing/2010/main" val="0"/>
+              </a:ext>
+            </a:extLst>
+          </a:blip>
+          <a:stretch>
+            <a:fillRect/>
+          </a:stretch>
+        </p:blipFill>
+        <p:spPr>
+          <a:xfrm>
+            <a:off x="0" y="1490137"/>
+            <a:ext cx="6864222" cy="4750241"/>
+          </a:xfrm>
+        </p:spPr>
+      </p:pic>
+      <p:pic>
+        <p:nvPicPr>
+          <p:cNvPr id="5" name="Imagem 4"/>
+          <p:cNvPicPr>
+            <a:picLocks noChangeAspect="1"/>
+          </p:cNvPicPr>
+          <p:nvPr/>
+        </p:nvPicPr>
+        <p:blipFill>
+          <a:blip r:embed="rId3">
+            <a:extLst>
+              <a:ext uri="{28A0092B-C50C-407E-A947-70E740481C1C}">
+                <a14:useLocalDpi xmlns:a14="http://schemas.microsoft.com/office/drawing/2010/main" val="0"/>
+              </a:ext>
+            </a:extLst>
+          </a:blip>
+          <a:stretch>
+            <a:fillRect/>
+          </a:stretch>
+        </p:blipFill>
+        <p:spPr>
+          <a:xfrm>
+            <a:off x="7254197" y="817674"/>
+            <a:ext cx="4440498" cy="5911989"/>
+          </a:xfrm>
+          <a:prstGeom prst="rect">
+            <a:avLst/>
+          </a:prstGeom>
+        </p:spPr>
+      </p:pic>
     </p:spTree>
     <p:extLst>
       <p:ext uri="{BB962C8B-B14F-4D97-AF65-F5344CB8AC3E}">
-        <p14:creationId xmlns:p14="http://schemas.microsoft.com/office/powerpoint/2010/main" val="2790896908"/>
+        <p14:creationId xmlns:p14="http://schemas.microsoft.com/office/powerpoint/2010/main" val="895932116"/>
       </p:ext>
     </p:extLst>
   </p:cSld>
@@ -3302,39 +4130,53 @@
           <a:p>
             <a:r>
               <a:rPr lang="pt-BR" dirty="0" smtClean="0"/>
-              <a:t>Continuação</a:t>
+              <a:t>Modelo OSI </a:t>
+            </a:r>
+            <a:r>
+              <a:rPr lang="pt-BR" dirty="0" err="1" smtClean="0"/>
+              <a:t>vs</a:t>
+            </a:r>
+            <a:r>
+              <a:rPr lang="pt-BR" dirty="0" smtClean="0"/>
+              <a:t> TCP/IP</a:t>
             </a:r>
             <a:endParaRPr lang="pt-BR" dirty="0"/>
           </a:p>
         </p:txBody>
       </p:sp>
-      <p:sp>
-        <p:nvSpPr>
-          <p:cNvPr id="3" name="Espaço Reservado para Conteúdo 2"/>
-          <p:cNvSpPr>
-            <a:spLocks noGrp="1"/>
-          </p:cNvSpPr>
+      <p:pic>
+        <p:nvPicPr>
+          <p:cNvPr id="4" name="Espaço Reservado para Conteúdo 3"/>
+          <p:cNvPicPr>
+            <a:picLocks noGrp="1" noChangeAspect="1"/>
+          </p:cNvPicPr>
           <p:nvPr>
             <p:ph idx="1"/>
           </p:nvPr>
-        </p:nvSpPr>
-        <p:spPr/>
-        <p:txBody>
-          <a:bodyPr/>
-          <a:lstStyle/>
-          <a:p>
-            <a:r>
-              <a:rPr lang="pt-BR" dirty="0" smtClean="0"/>
-              <a:t>exemplo</a:t>
-            </a:r>
-            <a:endParaRPr lang="pt-BR" dirty="0"/>
-          </a:p>
-        </p:txBody>
-      </p:sp>
+        </p:nvPicPr>
+        <p:blipFill>
+          <a:blip r:embed="rId2" cstate="print">
+            <a:extLst>
+              <a:ext uri="{28A0092B-C50C-407E-A947-70E740481C1C}">
+                <a14:useLocalDpi xmlns:a14="http://schemas.microsoft.com/office/drawing/2010/main" val="0"/>
+              </a:ext>
+            </a:extLst>
+          </a:blip>
+          <a:stretch>
+            <a:fillRect/>
+          </a:stretch>
+        </p:blipFill>
+        <p:spPr>
+          <a:xfrm>
+            <a:off x="2643576" y="1780425"/>
+            <a:ext cx="6988162" cy="4748712"/>
+          </a:xfrm>
+        </p:spPr>
+      </p:pic>
     </p:spTree>
     <p:extLst>
       <p:ext uri="{BB962C8B-B14F-4D97-AF65-F5344CB8AC3E}">
-        <p14:creationId xmlns:p14="http://schemas.microsoft.com/office/powerpoint/2010/main" val="2777912218"/>
+        <p14:creationId xmlns:p14="http://schemas.microsoft.com/office/powerpoint/2010/main" val="73657725"/>
       </p:ext>
     </p:extLst>
   </p:cSld>
@@ -3378,11 +4220,7 @@
           <a:p>
             <a:r>
               <a:rPr lang="pt-BR" dirty="0" smtClean="0"/>
-              <a:t>Ferramenta </a:t>
-            </a:r>
-            <a:r>
-              <a:rPr lang="pt-BR" dirty="0" err="1" smtClean="0"/>
-              <a:t>Wireshark</a:t>
+              <a:t>Protocolo HTTP</a:t>
             </a:r>
             <a:endParaRPr lang="pt-BR" dirty="0"/>
           </a:p>
@@ -3403,14 +4241,18 @@
           <a:bodyPr/>
           <a:lstStyle/>
           <a:p>
-            <a:endParaRPr lang="pt-BR"/>
+            <a:r>
+              <a:rPr lang="pt-BR" dirty="0" smtClean="0"/>
+              <a:t>texto</a:t>
+            </a:r>
+            <a:endParaRPr lang="pt-BR" dirty="0"/>
           </a:p>
         </p:txBody>
       </p:sp>
     </p:spTree>
     <p:extLst>
       <p:ext uri="{BB962C8B-B14F-4D97-AF65-F5344CB8AC3E}">
-        <p14:creationId xmlns:p14="http://schemas.microsoft.com/office/powerpoint/2010/main" val="3178691861"/>
+        <p14:creationId xmlns:p14="http://schemas.microsoft.com/office/powerpoint/2010/main" val="133886971"/>
       </p:ext>
     </p:extLst>
   </p:cSld>
@@ -3453,31 +4295,71 @@
           <a:lstStyle/>
           <a:p>
             <a:r>
+              <a:rPr lang="pt-BR" dirty="0" smtClean="0"/>
+              <a:t>Protocolo HTTPS</a:t>
+            </a:r>
+            <a:endParaRPr lang="pt-BR" dirty="0"/>
+          </a:p>
+        </p:txBody>
+      </p:sp>
+      <p:sp>
+        <p:nvSpPr>
+          <p:cNvPr id="3" name="Espaço Reservado para Conteúdo 2"/>
+          <p:cNvSpPr>
+            <a:spLocks noGrp="1"/>
+          </p:cNvSpPr>
+          <p:nvPr>
+            <p:ph idx="1"/>
+          </p:nvPr>
+        </p:nvSpPr>
+        <p:spPr/>
+        <p:txBody>
+          <a:bodyPr/>
+          <a:lstStyle/>
+          <a:p>
+            <a:r>
+              <a:rPr lang="pt-BR" dirty="0" smtClean="0"/>
+              <a:t>HTTPS é uma extensão segura do HTTP.</a:t>
+            </a:r>
+          </a:p>
+          <a:p>
+            <a:r>
               <a:rPr lang="pt-BR" dirty="0" err="1" smtClean="0"/>
-              <a:t>URLs</a:t>
-            </a:r>
-            <a:endParaRPr lang="pt-BR" dirty="0"/>
-          </a:p>
-        </p:txBody>
-      </p:sp>
-      <p:sp>
-        <p:nvSpPr>
-          <p:cNvPr id="3" name="Espaço Reservado para Conteúdo 2"/>
-          <p:cNvSpPr>
-            <a:spLocks noGrp="1"/>
-          </p:cNvSpPr>
-          <p:nvPr>
-            <p:ph idx="1"/>
-          </p:nvPr>
-        </p:nvSpPr>
-        <p:spPr/>
-        <p:txBody>
-          <a:bodyPr/>
-          <a:lstStyle/>
-          <a:p>
-            <a:r>
-              <a:rPr lang="pt-BR" dirty="0" smtClean="0"/>
-              <a:t>texto</a:t>
+              <a:t>HyperText</a:t>
+            </a:r>
+            <a:r>
+              <a:rPr lang="pt-BR" dirty="0" smtClean="0"/>
+              <a:t> </a:t>
+            </a:r>
+            <a:r>
+              <a:rPr lang="pt-BR" dirty="0" err="1" smtClean="0"/>
+              <a:t>Transfer</a:t>
+            </a:r>
+            <a:r>
+              <a:rPr lang="pt-BR" dirty="0" smtClean="0"/>
+              <a:t> </a:t>
+            </a:r>
+            <a:r>
+              <a:rPr lang="pt-BR" dirty="0" err="1" smtClean="0"/>
+              <a:t>Protocol</a:t>
+            </a:r>
+            <a:r>
+              <a:rPr lang="pt-BR" dirty="0" smtClean="0"/>
+              <a:t> </a:t>
+            </a:r>
+            <a:r>
+              <a:rPr lang="pt-BR" dirty="0" err="1" smtClean="0"/>
+              <a:t>Secure</a:t>
+            </a:r>
+            <a:r>
+              <a:rPr lang="pt-BR" dirty="0" smtClean="0"/>
+              <a:t> (HTTPS)</a:t>
+            </a:r>
+          </a:p>
+          <a:p>
+            <a:r>
+              <a:rPr lang="pt-BR" dirty="0" smtClean="0"/>
+              <a:t>Sites HTTPS configuram certificados SSL/TLS para estabelecer comunicação.</a:t>
             </a:r>
             <a:endParaRPr lang="pt-BR" dirty="0"/>
           </a:p>
@@ -3486,7 +4368,7 @@
     </p:spTree>
     <p:extLst>
       <p:ext uri="{BB962C8B-B14F-4D97-AF65-F5344CB8AC3E}">
-        <p14:creationId xmlns:p14="http://schemas.microsoft.com/office/powerpoint/2010/main" val="3422039854"/>
+        <p14:creationId xmlns:p14="http://schemas.microsoft.com/office/powerpoint/2010/main" val="2790896908"/>
       </p:ext>
     </p:extLst>
   </p:cSld>
@@ -3530,11 +4412,7 @@
           <a:p>
             <a:r>
               <a:rPr lang="pt-BR" dirty="0" smtClean="0"/>
-              <a:t>Hora da </a:t>
-            </a:r>
-            <a:r>
-              <a:rPr lang="pt-BR" smtClean="0"/>
-              <a:t>Brincadeira Pessoal !!!</a:t>
+              <a:t>Certificados SSL/TLS</a:t>
             </a:r>
             <a:endParaRPr lang="pt-BR" dirty="0"/>
           </a:p>
@@ -3556,8 +4434,64 @@
           <a:lstStyle/>
           <a:p>
             <a:r>
-              <a:rPr lang="pt-BR" dirty="0" smtClean="0"/>
-              <a:t>link</a:t>
+              <a:rPr lang="pt-BR" dirty="0" err="1" smtClean="0"/>
+              <a:t>Secure</a:t>
+            </a:r>
+            <a:r>
+              <a:rPr lang="pt-BR" dirty="0" smtClean="0"/>
+              <a:t> Sockets </a:t>
+            </a:r>
+            <a:r>
+              <a:rPr lang="pt-BR" dirty="0" err="1" smtClean="0"/>
+              <a:t>Layer</a:t>
+            </a:r>
+            <a:r>
+              <a:rPr lang="pt-BR" dirty="0" smtClean="0"/>
+              <a:t> (SSL);</a:t>
+            </a:r>
+          </a:p>
+          <a:p>
+            <a:r>
+              <a:rPr lang="pt-BR" dirty="0" err="1" smtClean="0"/>
+              <a:t>Transport</a:t>
+            </a:r>
+            <a:r>
+              <a:rPr lang="pt-BR" dirty="0" smtClean="0"/>
+              <a:t> </a:t>
+            </a:r>
+            <a:r>
+              <a:rPr lang="pt-BR" dirty="0" err="1" smtClean="0"/>
+              <a:t>Layer</a:t>
+            </a:r>
+            <a:r>
+              <a:rPr lang="pt-BR" dirty="0" smtClean="0"/>
+              <a:t> Security (TLS);</a:t>
+            </a:r>
+          </a:p>
+          <a:p>
+            <a:r>
+              <a:rPr lang="pt-BR" dirty="0" smtClean="0"/>
+              <a:t>Ambos são protocolos de encriptação de páginas web;</a:t>
+            </a:r>
+          </a:p>
+          <a:p>
+            <a:r>
+              <a:rPr lang="pt-BR" dirty="0" smtClean="0"/>
+              <a:t>SSL/TLS funcionam </a:t>
+            </a:r>
+            <a:r>
+              <a:rPr lang="pt-BR" dirty="0" err="1" smtClean="0"/>
+              <a:t>atraves</a:t>
+            </a:r>
+            <a:r>
+              <a:rPr lang="pt-BR" dirty="0" smtClean="0"/>
+              <a:t> de chaves publicas e privadas;</a:t>
+            </a:r>
+          </a:p>
+          <a:p>
+            <a:r>
+              <a:rPr lang="pt-BR" dirty="0" smtClean="0"/>
+              <a:t>Chaves para sessões;</a:t>
             </a:r>
             <a:endParaRPr lang="pt-BR" dirty="0"/>
           </a:p>
@@ -3566,7 +4500,7 @@
     </p:spTree>
     <p:extLst>
       <p:ext uri="{BB962C8B-B14F-4D97-AF65-F5344CB8AC3E}">
-        <p14:creationId xmlns:p14="http://schemas.microsoft.com/office/powerpoint/2010/main" val="1663024192"/>
+        <p14:creationId xmlns:p14="http://schemas.microsoft.com/office/powerpoint/2010/main" val="2777912218"/>
       </p:ext>
     </p:extLst>
   </p:cSld>
@@ -3610,7 +4544,7 @@
           <a:p>
             <a:r>
               <a:rPr lang="pt-BR" dirty="0" smtClean="0"/>
-              <a:t>Integrantes do Grupo</a:t>
+              <a:t>SLL != TLS</a:t>
             </a:r>
             <a:endParaRPr lang="pt-BR" dirty="0"/>
           </a:p>
@@ -3633,31 +4567,19 @@
           <a:p>
             <a:r>
               <a:rPr lang="pt-BR" dirty="0" smtClean="0"/>
-              <a:t>Carlos</a:t>
-            </a:r>
-          </a:p>
-          <a:p>
-            <a:r>
-              <a:rPr lang="pt-BR" dirty="0" smtClean="0"/>
-              <a:t>Eduardo</a:t>
-            </a:r>
-          </a:p>
-          <a:p>
-            <a:r>
-              <a:rPr lang="pt-BR" dirty="0" smtClean="0"/>
-              <a:t>Karoline</a:t>
-            </a:r>
-          </a:p>
-          <a:p>
-            <a:r>
-              <a:rPr lang="pt-BR" dirty="0" smtClean="0"/>
-              <a:t>Guilherme</a:t>
-            </a:r>
-          </a:p>
-          <a:p>
-            <a:r>
-              <a:rPr lang="pt-BR" dirty="0" smtClean="0"/>
-              <a:t>Vinicius</a:t>
+              <a:t>Diferenças pequenas e técnicas</a:t>
+            </a:r>
+          </a:p>
+          <a:p>
+            <a:r>
+              <a:rPr lang="pt-BR" dirty="0" smtClean="0"/>
+              <a:t>TLS utiliza portas diferentes</a:t>
+            </a:r>
+          </a:p>
+          <a:p>
+            <a:r>
+              <a:rPr lang="pt-BR" dirty="0" smtClean="0"/>
+              <a:t>TLS algoritmos de criptografia mais fortes</a:t>
             </a:r>
             <a:endParaRPr lang="pt-BR" dirty="0"/>
           </a:p>
@@ -3666,7 +4588,7 @@
     </p:spTree>
     <p:extLst>
       <p:ext uri="{BB962C8B-B14F-4D97-AF65-F5344CB8AC3E}">
-        <p14:creationId xmlns:p14="http://schemas.microsoft.com/office/powerpoint/2010/main" val="2695727957"/>
+        <p14:creationId xmlns:p14="http://schemas.microsoft.com/office/powerpoint/2010/main" val="3328378084"/>
       </p:ext>
     </p:extLst>
   </p:cSld>
@@ -3719,7 +4641,7 @@
     </a:clrScheme>
     <a:fontScheme name="Office">
       <a:majorFont>
-        <a:latin typeface="Calibri Light" panose="020F0302020204030204"/>
+        <a:latin typeface="Calibri Light"/>
         <a:ea typeface=""/>
         <a:cs typeface=""/>
         <a:font script="Jpan" typeface="游ゴシック Light"/>
@@ -3754,7 +4676,7 @@
         <a:font script="Geor" typeface="Sylfaen"/>
       </a:majorFont>
       <a:minorFont>
-        <a:latin typeface="Calibri" panose="020F0502020204030204"/>
+        <a:latin typeface="Calibri"/>
         <a:ea typeface=""/>
         <a:cs typeface=""/>
         <a:font script="Jpan" typeface="游ゴシック"/>
@@ -3931,7 +4853,7 @@
   <a:extraClrSchemeLst/>
   <a:extLst>
     <a:ext uri="{05A4C25C-085E-4340-85A3-A5531E510DB2}">
-      <thm15:themeFamily xmlns:thm15="http://schemas.microsoft.com/office/thememl/2012/main" name="Office Theme" id="{62F939B6-93AF-4DB8-9C6B-D6C7DFDC589F}" vid="{4A3C46E8-61CC-4603-A589-7422A47A8E4A}"/>
+      <thm15:themeFamily xmlns:thm15="http://schemas.microsoft.com/office/thememl/2012/main" xmlns="" name="Office Theme" id="{62F939B6-93AF-4DB8-9C6B-D6C7DFDC589F}" vid="{4A3C46E8-61CC-4603-A589-7422A47A8E4A}"/>
     </a:ext>
   </a:extLst>
 </a:theme>

</xml_diff>

<commit_message>
finalização do trabalho do Anderson
</commit_message>
<xml_diff>
--- a/UC_3/aula_1/Apresentacao.pptx
+++ b/UC_3/aula_1/Apresentacao.pptx
@@ -122,7 +122,18 @@
   </p:defaultTextStyle>
   <p:extLst>
     <p:ext uri="{EFAFB233-063F-42B5-8137-9DF3F51BA10A}">
-      <p15:sldGuideLst xmlns:p15="http://schemas.microsoft.com/office/powerpoint/2012/main" xmlns=""/>
+      <p15:sldGuideLst xmlns:p15="http://schemas.microsoft.com/office/powerpoint/2012/main">
+        <p15:guide id="1" orient="horz" pos="2160">
+          <p15:clr>
+            <a:srgbClr val="A4A3A4"/>
+          </p15:clr>
+        </p15:guide>
+        <p15:guide id="2" pos="3840">
+          <p15:clr>
+            <a:srgbClr val="A4A3A4"/>
+          </p15:clr>
+        </p15:guide>
+      </p15:sldGuideLst>
     </p:ext>
   </p:extLst>
 </p:presentation>
@@ -259,7 +270,7 @@
           <a:p>
             <a:fld id="{04A3E5E7-3360-4D12-B9E7-49E20BF306B1}" type="datetimeFigureOut">
               <a:rPr lang="pt-BR" smtClean="0"/>
-              <a:t>22/04/2019</a:t>
+              <a:t>23/04/2019</a:t>
             </a:fld>
             <a:endParaRPr lang="pt-BR"/>
           </a:p>
@@ -429,7 +440,7 @@
           <a:p>
             <a:fld id="{04A3E5E7-3360-4D12-B9E7-49E20BF306B1}" type="datetimeFigureOut">
               <a:rPr lang="pt-BR" smtClean="0"/>
-              <a:t>22/04/2019</a:t>
+              <a:t>23/04/2019</a:t>
             </a:fld>
             <a:endParaRPr lang="pt-BR"/>
           </a:p>
@@ -609,7 +620,7 @@
           <a:p>
             <a:fld id="{04A3E5E7-3360-4D12-B9E7-49E20BF306B1}" type="datetimeFigureOut">
               <a:rPr lang="pt-BR" smtClean="0"/>
-              <a:t>22/04/2019</a:t>
+              <a:t>23/04/2019</a:t>
             </a:fld>
             <a:endParaRPr lang="pt-BR"/>
           </a:p>
@@ -779,7 +790,7 @@
           <a:p>
             <a:fld id="{04A3E5E7-3360-4D12-B9E7-49E20BF306B1}" type="datetimeFigureOut">
               <a:rPr lang="pt-BR" smtClean="0"/>
-              <a:t>22/04/2019</a:t>
+              <a:t>23/04/2019</a:t>
             </a:fld>
             <a:endParaRPr lang="pt-BR"/>
           </a:p>
@@ -1025,7 +1036,7 @@
           <a:p>
             <a:fld id="{04A3E5E7-3360-4D12-B9E7-49E20BF306B1}" type="datetimeFigureOut">
               <a:rPr lang="pt-BR" smtClean="0"/>
-              <a:t>22/04/2019</a:t>
+              <a:t>23/04/2019</a:t>
             </a:fld>
             <a:endParaRPr lang="pt-BR"/>
           </a:p>
@@ -1257,7 +1268,7 @@
           <a:p>
             <a:fld id="{04A3E5E7-3360-4D12-B9E7-49E20BF306B1}" type="datetimeFigureOut">
               <a:rPr lang="pt-BR" smtClean="0"/>
-              <a:t>22/04/2019</a:t>
+              <a:t>23/04/2019</a:t>
             </a:fld>
             <a:endParaRPr lang="pt-BR"/>
           </a:p>
@@ -1624,7 +1635,7 @@
           <a:p>
             <a:fld id="{04A3E5E7-3360-4D12-B9E7-49E20BF306B1}" type="datetimeFigureOut">
               <a:rPr lang="pt-BR" smtClean="0"/>
-              <a:t>22/04/2019</a:t>
+              <a:t>23/04/2019</a:t>
             </a:fld>
             <a:endParaRPr lang="pt-BR"/>
           </a:p>
@@ -1742,7 +1753,7 @@
           <a:p>
             <a:fld id="{04A3E5E7-3360-4D12-B9E7-49E20BF306B1}" type="datetimeFigureOut">
               <a:rPr lang="pt-BR" smtClean="0"/>
-              <a:t>22/04/2019</a:t>
+              <a:t>23/04/2019</a:t>
             </a:fld>
             <a:endParaRPr lang="pt-BR"/>
           </a:p>
@@ -1837,7 +1848,7 @@
           <a:p>
             <a:fld id="{04A3E5E7-3360-4D12-B9E7-49E20BF306B1}" type="datetimeFigureOut">
               <a:rPr lang="pt-BR" smtClean="0"/>
-              <a:t>22/04/2019</a:t>
+              <a:t>23/04/2019</a:t>
             </a:fld>
             <a:endParaRPr lang="pt-BR"/>
           </a:p>
@@ -2114,7 +2125,7 @@
           <a:p>
             <a:fld id="{04A3E5E7-3360-4D12-B9E7-49E20BF306B1}" type="datetimeFigureOut">
               <a:rPr lang="pt-BR" smtClean="0"/>
-              <a:t>22/04/2019</a:t>
+              <a:t>23/04/2019</a:t>
             </a:fld>
             <a:endParaRPr lang="pt-BR"/>
           </a:p>
@@ -2367,7 +2378,7 @@
           <a:p>
             <a:fld id="{04A3E5E7-3360-4D12-B9E7-49E20BF306B1}" type="datetimeFigureOut">
               <a:rPr lang="pt-BR" smtClean="0"/>
-              <a:t>22/04/2019</a:t>
+              <a:t>23/04/2019</a:t>
             </a:fld>
             <a:endParaRPr lang="pt-BR"/>
           </a:p>
@@ -2580,7 +2591,7 @@
           <a:p>
             <a:fld id="{04A3E5E7-3360-4D12-B9E7-49E20BF306B1}" type="datetimeFigureOut">
               <a:rPr lang="pt-BR" smtClean="0"/>
-              <a:t>22/04/2019</a:t>
+              <a:t>23/04/2019</a:t>
             </a:fld>
             <a:endParaRPr lang="pt-BR"/>
           </a:p>
@@ -3045,6 +3056,13 @@
   <p:clrMapOvr>
     <a:masterClrMapping/>
   </p:clrMapOvr>
+  <p:timing>
+    <p:tnLst>
+      <p:par>
+        <p:cTn id="1" dur="indefinite" restart="never" nodeType="tmRoot"/>
+      </p:par>
+    </p:tnLst>
+  </p:timing>
 </p:sld>
 </file>
 
@@ -3127,6 +3145,13 @@
   <p:clrMapOvr>
     <a:masterClrMapping/>
   </p:clrMapOvr>
+  <p:timing>
+    <p:tnLst>
+      <p:par>
+        <p:cTn id="1" dur="indefinite" restart="never" nodeType="tmRoot"/>
+      </p:par>
+    </p:tnLst>
+  </p:timing>
 </p:sld>
 </file>
 
@@ -3217,6 +3242,13 @@
   <p:clrMapOvr>
     <a:masterClrMapping/>
   </p:clrMapOvr>
+  <p:timing>
+    <p:tnLst>
+      <p:par>
+        <p:cTn id="1" dur="indefinite" restart="never" nodeType="tmRoot"/>
+      </p:par>
+    </p:tnLst>
+  </p:timing>
 </p:sld>
 </file>
 
@@ -3280,8 +3312,10 @@
           <a:lstStyle/>
           <a:p>
             <a:r>
-              <a:rPr lang="pt-BR" dirty="0" smtClean="0"/>
-              <a:t>Link</a:t>
+              <a:rPr lang="pt-BR" dirty="0" smtClean="0">
+                <a:hlinkClick r:id="rId2" action="ppaction://hlinkfile"/>
+              </a:rPr>
+              <a:t>WIRESARK</a:t>
             </a:r>
             <a:endParaRPr lang="pt-BR" dirty="0"/>
           </a:p>
@@ -3297,6 +3331,13 @@
   <p:clrMapOvr>
     <a:masterClrMapping/>
   </p:clrMapOvr>
+  <p:timing>
+    <p:tnLst>
+      <p:par>
+        <p:cTn id="1" dur="indefinite" restart="never" nodeType="tmRoot"/>
+      </p:par>
+    </p:tnLst>
+  </p:timing>
 </p:sld>
 </file>
 
@@ -3373,6 +3414,13 @@
   <p:clrMapOvr>
     <a:masterClrMapping/>
   </p:clrMapOvr>
+  <p:timing>
+    <p:tnLst>
+      <p:par>
+        <p:cTn id="1" dur="indefinite" restart="never" nodeType="tmRoot"/>
+      </p:par>
+    </p:tnLst>
+  </p:timing>
 </p:sld>
 </file>
 
@@ -3453,6 +3501,13 @@
   <p:clrMapOvr>
     <a:masterClrMapping/>
   </p:clrMapOvr>
+  <p:timing>
+    <p:tnLst>
+      <p:par>
+        <p:cTn id="1" dur="indefinite" restart="never" nodeType="tmRoot"/>
+      </p:par>
+    </p:tnLst>
+  </p:timing>
 </p:sld>
 </file>
 
@@ -3881,6 +3936,13 @@
   <p:clrMapOvr>
     <a:masterClrMapping/>
   </p:clrMapOvr>
+  <p:timing>
+    <p:tnLst>
+      <p:par>
+        <p:cTn id="1" dur="indefinite" restart="never" nodeType="tmRoot"/>
+      </p:par>
+    </p:tnLst>
+  </p:timing>
 </p:sld>
 </file>
 
@@ -3981,6 +4043,13 @@
   <p:clrMapOvr>
     <a:masterClrMapping/>
   </p:clrMapOvr>
+  <p:timing>
+    <p:tnLst>
+      <p:par>
+        <p:cTn id="1" dur="indefinite" restart="never" nodeType="tmRoot"/>
+      </p:par>
+    </p:tnLst>
+  </p:timing>
 </p:sld>
 </file>
 
@@ -4093,6 +4162,13 @@
   <p:clrMapOvr>
     <a:masterClrMapping/>
   </p:clrMapOvr>
+  <p:timing>
+    <p:tnLst>
+      <p:par>
+        <p:cTn id="1" dur="indefinite" restart="never" nodeType="tmRoot"/>
+      </p:par>
+    </p:tnLst>
+  </p:timing>
 </p:sld>
 </file>
 
@@ -4183,6 +4259,13 @@
   <p:clrMapOvr>
     <a:masterClrMapping/>
   </p:clrMapOvr>
+  <p:timing>
+    <p:tnLst>
+      <p:par>
+        <p:cTn id="1" dur="indefinite" restart="never" nodeType="tmRoot"/>
+      </p:par>
+    </p:tnLst>
+  </p:timing>
 </p:sld>
 </file>
 
@@ -4259,6 +4342,13 @@
   <p:clrMapOvr>
     <a:masterClrMapping/>
   </p:clrMapOvr>
+  <p:timing>
+    <p:tnLst>
+      <p:par>
+        <p:cTn id="1" dur="indefinite" restart="never" nodeType="tmRoot"/>
+      </p:par>
+    </p:tnLst>
+  </p:timing>
 </p:sld>
 </file>
 
@@ -4375,6 +4465,13 @@
   <p:clrMapOvr>
     <a:masterClrMapping/>
   </p:clrMapOvr>
+  <p:timing>
+    <p:tnLst>
+      <p:par>
+        <p:cTn id="1" dur="indefinite" restart="never" nodeType="tmRoot"/>
+      </p:par>
+    </p:tnLst>
+  </p:timing>
 </p:sld>
 </file>
 
@@ -4507,6 +4604,13 @@
   <p:clrMapOvr>
     <a:masterClrMapping/>
   </p:clrMapOvr>
+  <p:timing>
+    <p:tnLst>
+      <p:par>
+        <p:cTn id="1" dur="indefinite" restart="never" nodeType="tmRoot"/>
+      </p:par>
+    </p:tnLst>
+  </p:timing>
 </p:sld>
 </file>
 
@@ -4595,6 +4699,13 @@
   <p:clrMapOvr>
     <a:masterClrMapping/>
   </p:clrMapOvr>
+  <p:timing>
+    <p:tnLst>
+      <p:par>
+        <p:cTn id="1" dur="indefinite" restart="never" nodeType="tmRoot"/>
+      </p:par>
+    </p:tnLst>
+  </p:timing>
 </p:sld>
 </file>
 
@@ -4853,7 +4964,7 @@
   <a:extraClrSchemeLst/>
   <a:extLst>
     <a:ext uri="{05A4C25C-085E-4340-85A3-A5531E510DB2}">
-      <thm15:themeFamily xmlns:thm15="http://schemas.microsoft.com/office/thememl/2012/main" xmlns="" name="Office Theme" id="{62F939B6-93AF-4DB8-9C6B-D6C7DFDC589F}" vid="{4A3C46E8-61CC-4603-A589-7422A47A8E4A}"/>
+      <thm15:themeFamily xmlns:thm15="http://schemas.microsoft.com/office/thememl/2012/main" name="Office Theme" id="{62F939B6-93AF-4DB8-9C6B-D6C7DFDC589F}" vid="{4A3C46E8-61CC-4603-A589-7422A47A8E4A}"/>
     </a:ext>
   </a:extLst>
 </a:theme>

</xml_diff>